<commit_message>
Added content to slide 2
</commit_message>
<xml_diff>
--- a/CABA 09182015.pptx
+++ b/CABA 09182015.pptx
@@ -3105,12 +3105,25 @@
           <a:p>
             <a:r>
               <a:rPr lang="en-US" dirty="0" smtClean="0"/>
-              <a:t>Version control: no need to rename files analysis v1.xlsx, analysis v2.xlsx, etc. All previous versions are accessible at any time via </a:t>
-            </a:r>
-            <a:r>
-              <a:rPr lang="en-US" smtClean="0"/>
-              <a:t>versioning system</a:t>
-            </a:r>
+              <a:t>Version control: no need to rename files analysis v1.xlsx, analysis v2.xlsx, etc. All previous versions are accessible at any time via versioning </a:t>
+            </a:r>
+            <a:r>
+              <a:rPr lang="en-US" dirty="0" smtClean="0"/>
+              <a:t>system</a:t>
+            </a:r>
+          </a:p>
+          <a:p>
+            <a:r>
+              <a:rPr lang="en-US" dirty="0" smtClean="0"/>
+              <a:t>Additional point 2</a:t>
+            </a:r>
+          </a:p>
+          <a:p>
+            <a:r>
+              <a:rPr lang="en-US" smtClean="0"/>
+              <a:t>Additional point 3</a:t>
+            </a:r>
+            <a:endParaRPr lang="en-US" smtClean="0"/>
           </a:p>
           <a:p>
             <a:endParaRPr lang="en-US" dirty="0"/>

</xml_diff>

<commit_message>
Final changes from Kirsten
@chiefmurph This deck covers my presentation focus. Feel free to add
content you want to include for R Markdown.
</commit_message>
<xml_diff>
--- a/CABA 09182015.pptx
+++ b/CABA 09182015.pptx
@@ -7,6 +7,7 @@
   <p:sldIdLst>
     <p:sldId id="256" r:id="rId2"/>
     <p:sldId id="257" r:id="rId3"/>
+    <p:sldId id="258" r:id="rId4"/>
   </p:sldIdLst>
   <p:sldSz cx="12192000" cy="6858000"/>
   <p:notesSz cx="6858000" cy="9144000"/>
@@ -2986,29 +2987,24 @@
         </p:nvSpPr>
         <p:spPr/>
         <p:txBody>
-          <a:bodyPr/>
-          <a:lstStyle/>
-          <a:p>
-            <a:r>
-              <a:rPr lang="en-US" dirty="0" smtClean="0"/>
-              <a:t>Collaboration Tools</a:t>
-            </a:r>
-            <a:br>
-              <a:rPr lang="en-US" dirty="0" smtClean="0"/>
-            </a:br>
-            <a:r>
-              <a:rPr lang="en-US" dirty="0" err="1" smtClean="0"/>
-              <a:t>Git</a:t>
-            </a:r>
-            <a:r>
-              <a:rPr lang="en-US" dirty="0" smtClean="0"/>
-              <a:t> and </a:t>
-            </a:r>
-            <a:r>
-              <a:rPr lang="en-US" dirty="0" err="1" smtClean="0"/>
-              <a:t>Rmarkdown</a:t>
-            </a:r>
-            <a:endParaRPr lang="en-US" dirty="0"/>
+          <a:bodyPr>
+            <a:normAutofit/>
+          </a:bodyPr>
+          <a:lstStyle/>
+          <a:p>
+            <a:r>
+              <a:rPr lang="en-US" sz="4400" dirty="0" smtClean="0"/>
+              <a:t>R Markdown and </a:t>
+            </a:r>
+            <a:r>
+              <a:rPr lang="en-US" sz="4400" dirty="0" err="1" smtClean="0"/>
+              <a:t>git</a:t>
+            </a:r>
+            <a:r>
+              <a:rPr lang="en-US" sz="4400" dirty="0" smtClean="0"/>
+              <a:t> for Collaborative Actuarial Research and Analysis</a:t>
+            </a:r>
+            <a:endParaRPr lang="en-US" sz="4400" dirty="0"/>
           </a:p>
         </p:txBody>
       </p:sp>
@@ -3024,10 +3020,28 @@
         </p:nvSpPr>
         <p:spPr/>
         <p:txBody>
-          <a:bodyPr/>
-          <a:lstStyle/>
-          <a:p>
-            <a:endParaRPr lang="en-US" dirty="0"/>
+          <a:bodyPr>
+            <a:normAutofit/>
+          </a:bodyPr>
+          <a:lstStyle/>
+          <a:p>
+            <a:r>
+              <a:rPr lang="en-US" sz="2800" dirty="0" smtClean="0"/>
+              <a:t>by</a:t>
+            </a:r>
+          </a:p>
+          <a:p>
+            <a:r>
+              <a:rPr lang="en-US" sz="2800" dirty="0" smtClean="0"/>
+              <a:t>Dan Murphy</a:t>
+            </a:r>
+          </a:p>
+          <a:p>
+            <a:r>
+              <a:rPr lang="en-US" sz="2800" dirty="0" smtClean="0"/>
+              <a:t>Kirsten Singer</a:t>
+            </a:r>
+            <a:endParaRPr lang="en-US" sz="2800" dirty="0"/>
           </a:p>
         </p:txBody>
       </p:sp>
@@ -3105,25 +3119,79 @@
           <a:p>
             <a:r>
               <a:rPr lang="en-US" dirty="0" smtClean="0"/>
-              <a:t>Version control: no need to rename files analysis v1.xlsx, analysis v2.xlsx, etc. All previous versions are accessible at any time via versioning </a:t>
+              <a:t>Version </a:t>
             </a:r>
             <a:r>
               <a:rPr lang="en-US" dirty="0" smtClean="0"/>
-              <a:t>system</a:t>
-            </a:r>
-          </a:p>
-          <a:p>
+              <a:t>control</a:t>
+            </a:r>
+          </a:p>
+          <a:p>
+            <a:pPr lvl="1"/>
             <a:r>
               <a:rPr lang="en-US" dirty="0" smtClean="0"/>
-              <a:t>Additional point 2</a:t>
-            </a:r>
-          </a:p>
-          <a:p>
-            <a:r>
-              <a:rPr lang="en-US" smtClean="0"/>
-              <a:t>Additional point 3</a:t>
-            </a:r>
-            <a:endParaRPr lang="en-US" smtClean="0"/>
+              <a:t>N</a:t>
+            </a:r>
+            <a:r>
+              <a:rPr lang="en-US" dirty="0" smtClean="0"/>
+              <a:t>o </a:t>
+            </a:r>
+            <a:r>
+              <a:rPr lang="en-US" dirty="0" smtClean="0"/>
+              <a:t>need to rename files </a:t>
+            </a:r>
+            <a:r>
+              <a:rPr lang="en-US" dirty="0" smtClean="0"/>
+              <a:t>v1, v2, v3, </a:t>
+            </a:r>
+            <a:r>
+              <a:rPr lang="en-US" dirty="0" smtClean="0"/>
+              <a:t>etc. All previous versions are accessible at any time via versioning </a:t>
+            </a:r>
+            <a:r>
+              <a:rPr lang="en-US" dirty="0" smtClean="0"/>
+              <a:t>system.</a:t>
+            </a:r>
+            <a:endParaRPr lang="en-US" dirty="0" smtClean="0"/>
+          </a:p>
+          <a:p>
+            <a:r>
+              <a:rPr lang="en-US" dirty="0" smtClean="0"/>
+              <a:t>More thorough documentation</a:t>
+            </a:r>
+          </a:p>
+          <a:p>
+            <a:pPr lvl="1"/>
+            <a:r>
+              <a:rPr lang="en-US" dirty="0" smtClean="0"/>
+              <a:t>The ‘commit change’ process promotes more adequate documentation</a:t>
+            </a:r>
+          </a:p>
+          <a:p>
+            <a:pPr lvl="1"/>
+            <a:r>
+              <a:rPr lang="en-US" dirty="0" smtClean="0"/>
+              <a:t>The user’s explanation of what changed is forever tied to the file  </a:t>
+            </a:r>
+            <a:r>
+              <a:rPr lang="en-US" dirty="0" smtClean="0"/>
+              <a:t> </a:t>
+            </a:r>
+            <a:endParaRPr lang="en-US" dirty="0" smtClean="0"/>
+          </a:p>
+          <a:p>
+            <a:r>
+              <a:rPr lang="en-US" dirty="0" smtClean="0"/>
+              <a:t>Common hub to store files</a:t>
+            </a:r>
+          </a:p>
+          <a:p>
+            <a:pPr lvl="1"/>
+            <a:r>
+              <a:rPr lang="en-US" dirty="0" smtClean="0"/>
+              <a:t>Helpful / necessary if collaborating outside of a common server environment</a:t>
+            </a:r>
+            <a:endParaRPr lang="en-US" dirty="0" smtClean="0"/>
           </a:p>
           <a:p>
             <a:endParaRPr lang="en-US" dirty="0"/>
@@ -3134,6 +3202,93 @@
     <p:extLst>
       <p:ext uri="{BB962C8B-B14F-4D97-AF65-F5344CB8AC3E}">
         <p14:creationId xmlns:p14="http://schemas.microsoft.com/office/powerpoint/2010/main" val="1336435810"/>
+      </p:ext>
+    </p:extLst>
+  </p:cSld>
+  <p:clrMapOvr>
+    <a:masterClrMapping/>
+  </p:clrMapOvr>
+</p:sld>
+</file>
+
+<file path=ppt/slides/slide3.xml><?xml version="1.0" encoding="utf-8"?>
+<p:sld xmlns:a="http://schemas.openxmlformats.org/drawingml/2006/main" xmlns:r="http://schemas.openxmlformats.org/officeDocument/2006/relationships" xmlns:p="http://schemas.openxmlformats.org/presentationml/2006/main">
+  <p:cSld>
+    <p:spTree>
+      <p:nvGrpSpPr>
+        <p:cNvPr id="1" name=""/>
+        <p:cNvGrpSpPr/>
+        <p:nvPr/>
+      </p:nvGrpSpPr>
+      <p:grpSpPr>
+        <a:xfrm>
+          <a:off x="0" y="0"/>
+          <a:ext cx="0" cy="0"/>
+          <a:chOff x="0" y="0"/>
+          <a:chExt cx="0" cy="0"/>
+        </a:xfrm>
+      </p:grpSpPr>
+      <p:sp>
+        <p:nvSpPr>
+          <p:cNvPr id="2" name="Title 1"/>
+          <p:cNvSpPr>
+            <a:spLocks noGrp="1"/>
+          </p:cNvSpPr>
+          <p:nvPr>
+            <p:ph type="title"/>
+          </p:nvPr>
+        </p:nvSpPr>
+        <p:spPr/>
+        <p:txBody>
+          <a:bodyPr/>
+          <a:lstStyle/>
+          <a:p>
+            <a:r>
+              <a:rPr lang="en-US" dirty="0" smtClean="0"/>
+              <a:t>Resources</a:t>
+            </a:r>
+            <a:endParaRPr lang="en-US" dirty="0"/>
+          </a:p>
+        </p:txBody>
+      </p:sp>
+      <p:sp>
+        <p:nvSpPr>
+          <p:cNvPr id="3" name="Content Placeholder 2"/>
+          <p:cNvSpPr>
+            <a:spLocks noGrp="1"/>
+          </p:cNvSpPr>
+          <p:nvPr>
+            <p:ph idx="1"/>
+          </p:nvPr>
+        </p:nvSpPr>
+        <p:spPr/>
+        <p:txBody>
+          <a:bodyPr/>
+          <a:lstStyle/>
+          <a:p>
+            <a:r>
+              <a:rPr lang="en-US" dirty="0" smtClean="0"/>
+              <a:t>www.github.com – free account for hosting projects</a:t>
+            </a:r>
+          </a:p>
+          <a:p>
+            <a:r>
+              <a:rPr lang="en-US" dirty="0" smtClean="0"/>
+              <a:t>desktop.github.com – download and installation guide for desktop interface for Macs and PCs</a:t>
+            </a:r>
+          </a:p>
+          <a:p>
+            <a:endParaRPr lang="en-US" dirty="0" smtClean="0"/>
+          </a:p>
+          <a:p>
+            <a:endParaRPr lang="en-US" dirty="0"/>
+          </a:p>
+        </p:txBody>
+      </p:sp>
+    </p:spTree>
+    <p:extLst>
+      <p:ext uri="{BB962C8B-B14F-4D97-AF65-F5344CB8AC3E}">
+        <p14:creationId xmlns:p14="http://schemas.microsoft.com/office/powerpoint/2010/main" val="1651879684"/>
       </p:ext>
     </p:extLst>
   </p:cSld>

</xml_diff>